<commit_message>
update van klassenoverzicht en van toelichting + update in gebruikersvriendelijkheid
</commit_message>
<xml_diff>
--- a/SchetsPlus.pptx
+++ b/SchetsPlus.pptx
@@ -3320,6 +3320,92 @@
       </p:grpSpPr>
       <p:sp>
         <p:nvSpPr>
+          <p:cNvPr id="91" name="Line 12"/>
+          <p:cNvSpPr>
+            <a:spLocks noChangeShapeType="1"/>
+          </p:cNvSpPr>
+          <p:nvPr/>
+        </p:nvSpPr>
+        <p:spPr bwMode="auto">
+          <a:xfrm>
+            <a:off x="6548215" y="3437356"/>
+            <a:ext cx="0" cy="304800"/>
+          </a:xfrm>
+          <a:prstGeom prst="line">
+            <a:avLst/>
+          </a:prstGeom>
+          <a:ln w="25400">
+            <a:headEnd/>
+            <a:tailEnd/>
+          </a:ln>
+        </p:spPr>
+        <p:style>
+          <a:lnRef idx="3">
+            <a:schemeClr val="accent4"/>
+          </a:lnRef>
+          <a:fillRef idx="0">
+            <a:schemeClr val="accent4"/>
+          </a:fillRef>
+          <a:effectRef idx="2">
+            <a:schemeClr val="accent4"/>
+          </a:effectRef>
+          <a:fontRef idx="minor">
+            <a:schemeClr val="tx1"/>
+          </a:fontRef>
+        </p:style>
+        <p:txBody>
+          <a:bodyPr/>
+          <a:lstStyle/>
+          <a:p>
+            <a:endParaRPr lang="en-US" dirty="0"/>
+          </a:p>
+        </p:txBody>
+      </p:sp>
+      <p:sp>
+        <p:nvSpPr>
+          <p:cNvPr id="89" name="Line 12"/>
+          <p:cNvSpPr>
+            <a:spLocks noChangeShapeType="1"/>
+          </p:cNvSpPr>
+          <p:nvPr/>
+        </p:nvSpPr>
+        <p:spPr bwMode="auto">
+          <a:xfrm>
+            <a:off x="3868583" y="3447073"/>
+            <a:ext cx="0" cy="304800"/>
+          </a:xfrm>
+          <a:prstGeom prst="line">
+            <a:avLst/>
+          </a:prstGeom>
+          <a:ln w="25400">
+            <a:headEnd/>
+            <a:tailEnd/>
+          </a:ln>
+        </p:spPr>
+        <p:style>
+          <a:lnRef idx="3">
+            <a:schemeClr val="accent4"/>
+          </a:lnRef>
+          <a:fillRef idx="0">
+            <a:schemeClr val="accent4"/>
+          </a:fillRef>
+          <a:effectRef idx="2">
+            <a:schemeClr val="accent4"/>
+          </a:effectRef>
+          <a:fontRef idx="minor">
+            <a:schemeClr val="tx1"/>
+          </a:fontRef>
+        </p:style>
+        <p:txBody>
+          <a:bodyPr/>
+          <a:lstStyle/>
+          <a:p>
+            <a:endParaRPr lang="en-US" dirty="0"/>
+          </a:p>
+        </p:txBody>
+      </p:sp>
+      <p:sp>
+        <p:nvSpPr>
           <p:cNvPr id="79" name="Line 12"/>
           <p:cNvSpPr>
             <a:spLocks noChangeShapeType="1"/>
@@ -3328,7 +3414,7 @@
         </p:nvSpPr>
         <p:spPr bwMode="auto">
           <a:xfrm flipV="1">
-            <a:off x="4026103" y="1143000"/>
+            <a:off x="4102303" y="1447800"/>
             <a:ext cx="442458" cy="0"/>
           </a:xfrm>
           <a:prstGeom prst="line">
@@ -3490,7 +3576,7 @@
             </a:lvl9pPr>
           </a:lstStyle>
           <a:p>
-            <a:endParaRPr lang="en-US"/>
+            <a:endParaRPr lang="en-US" dirty="0"/>
           </a:p>
         </p:txBody>
       </p:sp>
@@ -3504,7 +3590,7 @@
         </p:nvSpPr>
         <p:spPr bwMode="auto">
           <a:xfrm flipV="1">
-            <a:off x="4041507" y="1551426"/>
+            <a:off x="4117707" y="1856226"/>
             <a:ext cx="442458" cy="0"/>
           </a:xfrm>
           <a:prstGeom prst="line">
@@ -3666,22 +3752,167 @@
             </a:lvl9pPr>
           </a:lstStyle>
           <a:p>
-            <a:endParaRPr lang="en-US"/>
-          </a:p>
-        </p:txBody>
-      </p:sp>
-      <p:sp>
-        <p:nvSpPr>
-          <p:cNvPr id="77" name="Line 12"/>
+            <a:endParaRPr lang="en-US" dirty="0"/>
+          </a:p>
+        </p:txBody>
+      </p:sp>
+      <p:sp>
+        <p:nvSpPr>
+          <p:cNvPr id="74" name="Line 12"/>
           <p:cNvSpPr>
             <a:spLocks noChangeShapeType="1"/>
           </p:cNvSpPr>
           <p:nvPr/>
         </p:nvSpPr>
         <p:spPr bwMode="auto">
-          <a:xfrm flipV="1">
-            <a:off x="4016537" y="1142999"/>
-            <a:ext cx="0" cy="653532"/>
+          <a:xfrm>
+            <a:off x="7469300" y="5673114"/>
+            <a:ext cx="0" cy="304800"/>
+          </a:xfrm>
+          <a:prstGeom prst="line">
+            <a:avLst/>
+          </a:prstGeom>
+          <a:ln w="25400">
+            <a:headEnd/>
+            <a:tailEnd/>
+          </a:ln>
+        </p:spPr>
+        <p:style>
+          <a:lnRef idx="3">
+            <a:schemeClr val="accent4"/>
+          </a:lnRef>
+          <a:fillRef idx="0">
+            <a:schemeClr val="accent4"/>
+          </a:fillRef>
+          <a:effectRef idx="2">
+            <a:schemeClr val="accent4"/>
+          </a:effectRef>
+          <a:fontRef idx="minor">
+            <a:schemeClr val="tx1"/>
+          </a:fontRef>
+        </p:style>
+        <p:txBody>
+          <a:bodyPr/>
+          <a:lstStyle/>
+          <a:p>
+            <a:endParaRPr lang="en-US" dirty="0"/>
+          </a:p>
+        </p:txBody>
+      </p:sp>
+      <p:sp>
+        <p:nvSpPr>
+          <p:cNvPr id="172" name="Line 18"/>
+          <p:cNvSpPr>
+            <a:spLocks noChangeShapeType="1"/>
+          </p:cNvSpPr>
+          <p:nvPr/>
+        </p:nvSpPr>
+        <p:spPr bwMode="auto">
+          <a:xfrm>
+            <a:off x="4560165" y="4298477"/>
+            <a:ext cx="152400" cy="0"/>
+          </a:xfrm>
+          <a:prstGeom prst="line">
+            <a:avLst/>
+          </a:prstGeom>
+          <a:noFill/>
+          <a:ln w="25400">
+            <a:solidFill>
+              <a:schemeClr val="tx1"/>
+            </a:solidFill>
+            <a:round/>
+            <a:headEnd/>
+            <a:tailEnd/>
+          </a:ln>
+          <a:effectLst/>
+          <a:extLst>
+            <a:ext uri="{909E8E84-426E-40DD-AFC4-6F175D3DCCD1}">
+              <a14:hiddenFill xmlns:a14="http://schemas.microsoft.com/office/drawing/2010/main">
+                <a:noFill/>
+              </a14:hiddenFill>
+            </a:ext>
+            <a:ext uri="{AF507438-7753-43E0-B8FC-AC1667EBCBE1}">
+              <a14:hiddenEffects xmlns:a14="http://schemas.microsoft.com/office/drawing/2010/main">
+                <a:effectLst>
+                  <a:outerShdw dist="35921" dir="2700000" algn="ctr" rotWithShape="0">
+                    <a:schemeClr val="bg2"/>
+                  </a:outerShdw>
+                </a:effectLst>
+              </a14:hiddenEffects>
+            </a:ext>
+          </a:extLst>
+        </p:spPr>
+        <p:txBody>
+          <a:bodyPr/>
+          <a:lstStyle/>
+          <a:p>
+            <a:endParaRPr lang="en-US" dirty="0"/>
+          </a:p>
+        </p:txBody>
+      </p:sp>
+      <p:sp>
+        <p:nvSpPr>
+          <p:cNvPr id="143" name="Line 23"/>
+          <p:cNvSpPr>
+            <a:spLocks noChangeShapeType="1"/>
+          </p:cNvSpPr>
+          <p:nvPr/>
+        </p:nvSpPr>
+        <p:spPr bwMode="auto">
+          <a:xfrm>
+            <a:off x="4560165" y="5167117"/>
+            <a:ext cx="152400" cy="0"/>
+          </a:xfrm>
+          <a:prstGeom prst="line">
+            <a:avLst/>
+          </a:prstGeom>
+          <a:noFill/>
+          <a:ln w="25400">
+            <a:solidFill>
+              <a:schemeClr val="tx1"/>
+            </a:solidFill>
+            <a:round/>
+            <a:headEnd/>
+            <a:tailEnd/>
+          </a:ln>
+          <a:effectLst/>
+          <a:extLst>
+            <a:ext uri="{909E8E84-426E-40DD-AFC4-6F175D3DCCD1}">
+              <a14:hiddenFill xmlns:a14="http://schemas.microsoft.com/office/drawing/2010/main">
+                <a:noFill/>
+              </a14:hiddenFill>
+            </a:ext>
+            <a:ext uri="{AF507438-7753-43E0-B8FC-AC1667EBCBE1}">
+              <a14:hiddenEffects xmlns:a14="http://schemas.microsoft.com/office/drawing/2010/main">
+                <a:effectLst>
+                  <a:outerShdw dist="35921" dir="2700000" algn="ctr" rotWithShape="0">
+                    <a:schemeClr val="bg2"/>
+                  </a:outerShdw>
+                </a:effectLst>
+              </a14:hiddenEffects>
+            </a:ext>
+          </a:extLst>
+        </p:spPr>
+        <p:txBody>
+          <a:bodyPr/>
+          <a:lstStyle/>
+          <a:p>
+            <a:endParaRPr lang="en-US" dirty="0"/>
+          </a:p>
+        </p:txBody>
+      </p:sp>
+      <p:sp>
+        <p:nvSpPr>
+          <p:cNvPr id="72" name="Line 12"/>
+          <p:cNvSpPr>
+            <a:spLocks noChangeShapeType="1"/>
+          </p:cNvSpPr>
+          <p:nvPr/>
+        </p:nvSpPr>
+        <p:spPr bwMode="auto">
+          <a:xfrm>
+            <a:off x="4329089" y="2228852"/>
+            <a:ext cx="215672" cy="2334"/>
           </a:xfrm>
           <a:prstGeom prst="line">
             <a:avLst/>
@@ -3842,342 +4073,21 @@
             </a:lvl9pPr>
           </a:lstStyle>
           <a:p>
-            <a:endParaRPr lang="en-US"/>
-          </a:p>
-        </p:txBody>
-      </p:sp>
-      <p:sp>
-        <p:nvSpPr>
-          <p:cNvPr id="74" name="Line 12"/>
-          <p:cNvSpPr>
-            <a:spLocks noChangeShapeType="1"/>
+            <a:endParaRPr lang="en-US" dirty="0"/>
+          </a:p>
+        </p:txBody>
+      </p:sp>
+      <p:sp>
+        <p:nvSpPr>
+          <p:cNvPr id="106" name="Rectangle 27"/>
+          <p:cNvSpPr>
+            <a:spLocks noChangeArrowheads="1"/>
           </p:cNvSpPr>
           <p:nvPr/>
         </p:nvSpPr>
         <p:spPr bwMode="auto">
           <a:xfrm>
-            <a:off x="7393100" y="5368314"/>
-            <a:ext cx="0" cy="304800"/>
-          </a:xfrm>
-          <a:prstGeom prst="line">
-            <a:avLst/>
-          </a:prstGeom>
-          <a:ln w="25400">
-            <a:headEnd/>
-            <a:tailEnd/>
-          </a:ln>
-        </p:spPr>
-        <p:style>
-          <a:lnRef idx="3">
-            <a:schemeClr val="accent4"/>
-          </a:lnRef>
-          <a:fillRef idx="0">
-            <a:schemeClr val="accent4"/>
-          </a:fillRef>
-          <a:effectRef idx="2">
-            <a:schemeClr val="accent4"/>
-          </a:effectRef>
-          <a:fontRef idx="minor">
-            <a:schemeClr val="tx1"/>
-          </a:fontRef>
-        </p:style>
-        <p:txBody>
-          <a:bodyPr/>
-          <a:lstStyle/>
-          <a:p>
-            <a:endParaRPr lang="en-US"/>
-          </a:p>
-        </p:txBody>
-      </p:sp>
-      <p:sp>
-        <p:nvSpPr>
-          <p:cNvPr id="172" name="Line 18"/>
-          <p:cNvSpPr>
-            <a:spLocks noChangeShapeType="1"/>
-          </p:cNvSpPr>
-          <p:nvPr/>
-        </p:nvSpPr>
-        <p:spPr bwMode="auto">
-          <a:xfrm>
-            <a:off x="4483965" y="3993677"/>
-            <a:ext cx="152400" cy="0"/>
-          </a:xfrm>
-          <a:prstGeom prst="line">
-            <a:avLst/>
-          </a:prstGeom>
-          <a:noFill/>
-          <a:ln w="25400">
-            <a:solidFill>
-              <a:schemeClr val="tx1"/>
-            </a:solidFill>
-            <a:round/>
-            <a:headEnd/>
-            <a:tailEnd/>
-          </a:ln>
-          <a:effectLst/>
-          <a:extLst>
-            <a:ext uri="{909E8E84-426E-40DD-AFC4-6F175D3DCCD1}">
-              <a14:hiddenFill xmlns:a14="http://schemas.microsoft.com/office/drawing/2010/main">
-                <a:noFill/>
-              </a14:hiddenFill>
-            </a:ext>
-            <a:ext uri="{AF507438-7753-43E0-B8FC-AC1667EBCBE1}">
-              <a14:hiddenEffects xmlns:a14="http://schemas.microsoft.com/office/drawing/2010/main">
-                <a:effectLst>
-                  <a:outerShdw dist="35921" dir="2700000" algn="ctr" rotWithShape="0">
-                    <a:schemeClr val="bg2"/>
-                  </a:outerShdw>
-                </a:effectLst>
-              </a14:hiddenEffects>
-            </a:ext>
-          </a:extLst>
-        </p:spPr>
-        <p:txBody>
-          <a:bodyPr/>
-          <a:lstStyle/>
-          <a:p>
-            <a:endParaRPr lang="en-US"/>
-          </a:p>
-        </p:txBody>
-      </p:sp>
-      <p:sp>
-        <p:nvSpPr>
-          <p:cNvPr id="143" name="Line 23"/>
-          <p:cNvSpPr>
-            <a:spLocks noChangeShapeType="1"/>
-          </p:cNvSpPr>
-          <p:nvPr/>
-        </p:nvSpPr>
-        <p:spPr bwMode="auto">
-          <a:xfrm>
-            <a:off x="4483965" y="4862317"/>
-            <a:ext cx="152400" cy="0"/>
-          </a:xfrm>
-          <a:prstGeom prst="line">
-            <a:avLst/>
-          </a:prstGeom>
-          <a:noFill/>
-          <a:ln w="25400">
-            <a:solidFill>
-              <a:schemeClr val="tx1"/>
-            </a:solidFill>
-            <a:round/>
-            <a:headEnd/>
-            <a:tailEnd/>
-          </a:ln>
-          <a:effectLst/>
-          <a:extLst>
-            <a:ext uri="{909E8E84-426E-40DD-AFC4-6F175D3DCCD1}">
-              <a14:hiddenFill xmlns:a14="http://schemas.microsoft.com/office/drawing/2010/main">
-                <a:noFill/>
-              </a14:hiddenFill>
-            </a:ext>
-            <a:ext uri="{AF507438-7753-43E0-B8FC-AC1667EBCBE1}">
-              <a14:hiddenEffects xmlns:a14="http://schemas.microsoft.com/office/drawing/2010/main">
-                <a:effectLst>
-                  <a:outerShdw dist="35921" dir="2700000" algn="ctr" rotWithShape="0">
-                    <a:schemeClr val="bg2"/>
-                  </a:outerShdw>
-                </a:effectLst>
-              </a14:hiddenEffects>
-            </a:ext>
-          </a:extLst>
-        </p:spPr>
-        <p:txBody>
-          <a:bodyPr/>
-          <a:lstStyle/>
-          <a:p>
-            <a:endParaRPr lang="en-US"/>
-          </a:p>
-        </p:txBody>
-      </p:sp>
-      <p:sp>
-        <p:nvSpPr>
-          <p:cNvPr id="72" name="Line 12"/>
-          <p:cNvSpPr>
-            <a:spLocks noChangeShapeType="1"/>
-          </p:cNvSpPr>
-          <p:nvPr/>
-        </p:nvSpPr>
-        <p:spPr bwMode="auto">
-          <a:xfrm>
-            <a:off x="4252889" y="1924052"/>
-            <a:ext cx="215672" cy="2334"/>
-          </a:xfrm>
-          <a:prstGeom prst="line">
-            <a:avLst/>
-          </a:prstGeom>
-          <a:noFill/>
-          <a:ln w="25400">
-            <a:solidFill>
-              <a:schemeClr val="tx1"/>
-            </a:solidFill>
-            <a:prstDash val="sysDot"/>
-            <a:round/>
-            <a:headEnd/>
-            <a:tailEnd/>
-          </a:ln>
-          <a:effectLst/>
-          <a:extLst>
-            <a:ext uri="{909E8E84-426E-40DD-AFC4-6F175D3DCCD1}">
-              <a14:hiddenFill xmlns:a14="http://schemas.microsoft.com/office/drawing/2010/main">
-                <a:noFill/>
-              </a14:hiddenFill>
-            </a:ext>
-            <a:ext uri="{AF507438-7753-43E0-B8FC-AC1667EBCBE1}">
-              <a14:hiddenEffects xmlns:a14="http://schemas.microsoft.com/office/drawing/2010/main">
-                <a:effectLst>
-                  <a:outerShdw dist="35921" dir="2700000" algn="ctr" rotWithShape="0">
-                    <a:schemeClr val="bg2"/>
-                  </a:outerShdw>
-                </a:effectLst>
-              </a14:hiddenEffects>
-            </a:ext>
-          </a:extLst>
-        </p:spPr>
-        <p:txBody>
-          <a:bodyPr/>
-          <a:lstStyle>
-            <a:defPPr>
-              <a:defRPr lang="en-US"/>
-            </a:defPPr>
-            <a:lvl1pPr algn="l" rtl="0" fontAlgn="base">
-              <a:spcBef>
-                <a:spcPct val="0"/>
-              </a:spcBef>
-              <a:spcAft>
-                <a:spcPct val="0"/>
-              </a:spcAft>
-              <a:defRPr kern="1200">
-                <a:solidFill>
-                  <a:schemeClr val="tx1"/>
-                </a:solidFill>
-                <a:latin typeface="Arial" panose="020B0604020202020204" pitchFamily="34" charset="0"/>
-                <a:ea typeface="+mn-ea"/>
-                <a:cs typeface="+mn-cs"/>
-              </a:defRPr>
-            </a:lvl1pPr>
-            <a:lvl2pPr marL="457200" algn="l" rtl="0" fontAlgn="base">
-              <a:spcBef>
-                <a:spcPct val="0"/>
-              </a:spcBef>
-              <a:spcAft>
-                <a:spcPct val="0"/>
-              </a:spcAft>
-              <a:defRPr kern="1200">
-                <a:solidFill>
-                  <a:schemeClr val="tx1"/>
-                </a:solidFill>
-                <a:latin typeface="Arial" panose="020B0604020202020204" pitchFamily="34" charset="0"/>
-                <a:ea typeface="+mn-ea"/>
-                <a:cs typeface="+mn-cs"/>
-              </a:defRPr>
-            </a:lvl2pPr>
-            <a:lvl3pPr marL="914400" algn="l" rtl="0" fontAlgn="base">
-              <a:spcBef>
-                <a:spcPct val="0"/>
-              </a:spcBef>
-              <a:spcAft>
-                <a:spcPct val="0"/>
-              </a:spcAft>
-              <a:defRPr kern="1200">
-                <a:solidFill>
-                  <a:schemeClr val="tx1"/>
-                </a:solidFill>
-                <a:latin typeface="Arial" panose="020B0604020202020204" pitchFamily="34" charset="0"/>
-                <a:ea typeface="+mn-ea"/>
-                <a:cs typeface="+mn-cs"/>
-              </a:defRPr>
-            </a:lvl3pPr>
-            <a:lvl4pPr marL="1371600" algn="l" rtl="0" fontAlgn="base">
-              <a:spcBef>
-                <a:spcPct val="0"/>
-              </a:spcBef>
-              <a:spcAft>
-                <a:spcPct val="0"/>
-              </a:spcAft>
-              <a:defRPr kern="1200">
-                <a:solidFill>
-                  <a:schemeClr val="tx1"/>
-                </a:solidFill>
-                <a:latin typeface="Arial" panose="020B0604020202020204" pitchFamily="34" charset="0"/>
-                <a:ea typeface="+mn-ea"/>
-                <a:cs typeface="+mn-cs"/>
-              </a:defRPr>
-            </a:lvl4pPr>
-            <a:lvl5pPr marL="1828800" algn="l" rtl="0" fontAlgn="base">
-              <a:spcBef>
-                <a:spcPct val="0"/>
-              </a:spcBef>
-              <a:spcAft>
-                <a:spcPct val="0"/>
-              </a:spcAft>
-              <a:defRPr kern="1200">
-                <a:solidFill>
-                  <a:schemeClr val="tx1"/>
-                </a:solidFill>
-                <a:latin typeface="Arial" panose="020B0604020202020204" pitchFamily="34" charset="0"/>
-                <a:ea typeface="+mn-ea"/>
-                <a:cs typeface="+mn-cs"/>
-              </a:defRPr>
-            </a:lvl5pPr>
-            <a:lvl6pPr marL="2286000" algn="l" defTabSz="914400" rtl="0" eaLnBrk="1" latinLnBrk="0" hangingPunct="1">
-              <a:defRPr kern="1200">
-                <a:solidFill>
-                  <a:schemeClr val="tx1"/>
-                </a:solidFill>
-                <a:latin typeface="Arial" panose="020B0604020202020204" pitchFamily="34" charset="0"/>
-                <a:ea typeface="+mn-ea"/>
-                <a:cs typeface="+mn-cs"/>
-              </a:defRPr>
-            </a:lvl6pPr>
-            <a:lvl7pPr marL="2743200" algn="l" defTabSz="914400" rtl="0" eaLnBrk="1" latinLnBrk="0" hangingPunct="1">
-              <a:defRPr kern="1200">
-                <a:solidFill>
-                  <a:schemeClr val="tx1"/>
-                </a:solidFill>
-                <a:latin typeface="Arial" panose="020B0604020202020204" pitchFamily="34" charset="0"/>
-                <a:ea typeface="+mn-ea"/>
-                <a:cs typeface="+mn-cs"/>
-              </a:defRPr>
-            </a:lvl7pPr>
-            <a:lvl8pPr marL="3200400" algn="l" defTabSz="914400" rtl="0" eaLnBrk="1" latinLnBrk="0" hangingPunct="1">
-              <a:defRPr kern="1200">
-                <a:solidFill>
-                  <a:schemeClr val="tx1"/>
-                </a:solidFill>
-                <a:latin typeface="Arial" panose="020B0604020202020204" pitchFamily="34" charset="0"/>
-                <a:ea typeface="+mn-ea"/>
-                <a:cs typeface="+mn-cs"/>
-              </a:defRPr>
-            </a:lvl8pPr>
-            <a:lvl9pPr marL="3657600" algn="l" defTabSz="914400" rtl="0" eaLnBrk="1" latinLnBrk="0" hangingPunct="1">
-              <a:defRPr kern="1200">
-                <a:solidFill>
-                  <a:schemeClr val="tx1"/>
-                </a:solidFill>
-                <a:latin typeface="Arial" panose="020B0604020202020204" pitchFamily="34" charset="0"/>
-                <a:ea typeface="+mn-ea"/>
-                <a:cs typeface="+mn-cs"/>
-              </a:defRPr>
-            </a:lvl9pPr>
-          </a:lstStyle>
-          <a:p>
-            <a:endParaRPr lang="en-US"/>
-          </a:p>
-        </p:txBody>
-      </p:sp>
-      <p:sp>
-        <p:nvSpPr>
-          <p:cNvPr id="106" name="Rectangle 27"/>
-          <p:cNvSpPr>
-            <a:spLocks noChangeArrowheads="1"/>
-          </p:cNvSpPr>
-          <p:nvPr/>
-        </p:nvSpPr>
-        <p:spPr bwMode="auto">
-          <a:xfrm>
-            <a:off x="657225" y="3048000"/>
+            <a:off x="733425" y="3352800"/>
             <a:ext cx="838200" cy="304800"/>
           </a:xfrm>
           <a:prstGeom prst="rect">
@@ -4213,7 +4123,7 @@
           <a:p>
             <a:pPr algn="ctr"/>
             <a:r>
-              <a:rPr lang="en-US" altLang="en-US" sz="1000">
+              <a:rPr lang="en-US" altLang="en-US" sz="1000" dirty="0">
                 <a:latin typeface="Tahoma" panose="020B0604030504040204" pitchFamily="34" charset="0"/>
               </a:rPr>
               <a:t>Form</a:t>
@@ -4231,7 +4141,7 @@
         </p:nvSpPr>
         <p:spPr bwMode="auto">
           <a:xfrm>
-            <a:off x="276225" y="3200400"/>
+            <a:off x="352425" y="3505200"/>
             <a:ext cx="381000" cy="0"/>
           </a:xfrm>
           <a:prstGeom prst="line">
@@ -4268,7 +4178,7 @@
           <a:bodyPr/>
           <a:lstStyle/>
           <a:p>
-            <a:endParaRPr lang="en-US"/>
+            <a:endParaRPr lang="en-US" dirty="0"/>
           </a:p>
         </p:txBody>
       </p:sp>
@@ -4282,7 +4192,7 @@
         </p:nvSpPr>
         <p:spPr bwMode="auto">
           <a:xfrm>
-            <a:off x="504825" y="3200400"/>
+            <a:off x="581025" y="3505200"/>
             <a:ext cx="0" cy="990600"/>
           </a:xfrm>
           <a:prstGeom prst="line">
@@ -4319,7 +4229,7 @@
           <a:bodyPr/>
           <a:lstStyle/>
           <a:p>
-            <a:endParaRPr lang="en-US"/>
+            <a:endParaRPr lang="en-US" dirty="0"/>
           </a:p>
         </p:txBody>
       </p:sp>
@@ -4333,7 +4243,7 @@
         </p:nvSpPr>
         <p:spPr bwMode="auto">
           <a:xfrm>
-            <a:off x="657225" y="4038600"/>
+            <a:off x="733425" y="4343400"/>
             <a:ext cx="838200" cy="304800"/>
           </a:xfrm>
           <a:prstGeom prst="rect">
@@ -4369,11 +4279,14 @@
           <a:p>
             <a:pPr algn="ctr"/>
             <a:r>
-              <a:rPr lang="en-US" altLang="en-US" sz="1000">
+              <a:rPr lang="en-US" altLang="en-US" sz="1000" dirty="0" err="1">
                 <a:latin typeface="Tahoma" panose="020B0604030504040204" pitchFamily="34" charset="0"/>
               </a:rPr>
               <a:t>UserControl</a:t>
             </a:r>
+            <a:endParaRPr lang="en-US" altLang="en-US" sz="1000" dirty="0">
+              <a:latin typeface="Tahoma" panose="020B0604030504040204" pitchFamily="34" charset="0"/>
+            </a:endParaRPr>
           </a:p>
         </p:txBody>
       </p:sp>
@@ -4387,7 +4300,7 @@
         </p:nvSpPr>
         <p:spPr bwMode="auto">
           <a:xfrm>
-            <a:off x="504825" y="4191000"/>
+            <a:off x="581025" y="4495800"/>
             <a:ext cx="152400" cy="0"/>
           </a:xfrm>
           <a:prstGeom prst="line">
@@ -4438,7 +4351,7 @@
         </p:nvSpPr>
         <p:spPr bwMode="auto">
           <a:xfrm>
-            <a:off x="2181225" y="3048000"/>
+            <a:off x="2257425" y="3352800"/>
             <a:ext cx="956078" cy="304800"/>
           </a:xfrm>
           <a:prstGeom prst="rect">
@@ -4492,7 +4405,7 @@
         </p:nvSpPr>
         <p:spPr bwMode="auto">
           <a:xfrm>
-            <a:off x="2181224" y="3505200"/>
+            <a:off x="2257424" y="3810000"/>
             <a:ext cx="956079" cy="304800"/>
           </a:xfrm>
           <a:prstGeom prst="rect">
@@ -4546,7 +4459,7 @@
         </p:nvSpPr>
         <p:spPr bwMode="auto">
           <a:xfrm>
-            <a:off x="1495425" y="3200400"/>
+            <a:off x="1571625" y="3505200"/>
             <a:ext cx="685800" cy="0"/>
           </a:xfrm>
           <a:prstGeom prst="line">
@@ -4597,7 +4510,7 @@
         </p:nvSpPr>
         <p:spPr bwMode="auto">
           <a:xfrm>
-            <a:off x="1800225" y="3657600"/>
+            <a:off x="1876425" y="3962400"/>
             <a:ext cx="381000" cy="0"/>
           </a:xfrm>
           <a:prstGeom prst="line">
@@ -4648,7 +4561,7 @@
         </p:nvSpPr>
         <p:spPr bwMode="auto">
           <a:xfrm>
-            <a:off x="1800225" y="3200400"/>
+            <a:off x="1876425" y="3505200"/>
             <a:ext cx="0" cy="457200"/>
           </a:xfrm>
           <a:prstGeom prst="line">
@@ -4699,7 +4612,7 @@
         </p:nvSpPr>
         <p:spPr bwMode="auto">
           <a:xfrm>
-            <a:off x="2181225" y="4038600"/>
+            <a:off x="2257425" y="4343400"/>
             <a:ext cx="948926" cy="304800"/>
           </a:xfrm>
           <a:prstGeom prst="rect">
@@ -4756,7 +4669,7 @@
         </p:nvSpPr>
         <p:spPr bwMode="auto">
           <a:xfrm>
-            <a:off x="1495425" y="4191000"/>
+            <a:off x="1571625" y="4495800"/>
             <a:ext cx="685800" cy="0"/>
           </a:xfrm>
           <a:prstGeom prst="line">
@@ -4807,7 +4720,7 @@
         </p:nvSpPr>
         <p:spPr bwMode="auto">
           <a:xfrm>
-            <a:off x="2181225" y="4572000"/>
+            <a:off x="2257425" y="4876800"/>
             <a:ext cx="948926" cy="304800"/>
           </a:xfrm>
           <a:prstGeom prst="rect">
@@ -4864,8 +4777,8 @@
         </p:nvSpPr>
         <p:spPr bwMode="auto">
           <a:xfrm>
-            <a:off x="1981200" y="762000"/>
-            <a:ext cx="6816404" cy="5257800"/>
+            <a:off x="2057400" y="381000"/>
+            <a:ext cx="6816404" cy="5943600"/>
           </a:xfrm>
           <a:prstGeom prst="roundRect">
             <a:avLst>
@@ -4920,7 +4833,7 @@
         </p:nvSpPr>
         <p:spPr bwMode="auto">
           <a:xfrm>
-            <a:off x="200025" y="2743200"/>
+            <a:off x="276225" y="3048000"/>
             <a:ext cx="1447800" cy="1752600"/>
           </a:xfrm>
           <a:prstGeom prst="roundRect">
@@ -4976,7 +4889,7 @@
         </p:nvSpPr>
         <p:spPr bwMode="auto">
           <a:xfrm>
-            <a:off x="228600" y="2832031"/>
+            <a:off x="304800" y="3136831"/>
             <a:ext cx="1524000" cy="152400"/>
           </a:xfrm>
           <a:prstGeom prst="rect">
@@ -5049,7 +4962,7 @@
         </p:nvSpPr>
         <p:spPr bwMode="auto">
           <a:xfrm>
-            <a:off x="2181224" y="2133600"/>
+            <a:off x="2257424" y="2438400"/>
             <a:ext cx="956079" cy="304800"/>
           </a:xfrm>
           <a:prstGeom prst="rect">
@@ -5103,7 +5016,7 @@
         </p:nvSpPr>
         <p:spPr bwMode="auto">
           <a:xfrm>
-            <a:off x="3338489" y="1796533"/>
+            <a:off x="3414689" y="2101333"/>
             <a:ext cx="914400" cy="304800"/>
           </a:xfrm>
           <a:prstGeom prst="roundRect">
@@ -5291,7 +5204,7 @@
         </p:nvSpPr>
         <p:spPr bwMode="auto">
           <a:xfrm>
-            <a:off x="3795689" y="2101333"/>
+            <a:off x="3871889" y="2406133"/>
             <a:ext cx="0" cy="304800"/>
           </a:xfrm>
           <a:prstGeom prst="line">
@@ -5467,7 +5380,7 @@
         </p:nvSpPr>
         <p:spPr bwMode="auto">
           <a:xfrm>
-            <a:off x="4180674" y="2558533"/>
+            <a:off x="4256874" y="2863333"/>
             <a:ext cx="314325" cy="0"/>
           </a:xfrm>
           <a:prstGeom prst="line">
@@ -5518,7 +5431,7 @@
         </p:nvSpPr>
         <p:spPr bwMode="auto">
           <a:xfrm>
-            <a:off x="3342474" y="2406133"/>
+            <a:off x="3418674" y="2710933"/>
             <a:ext cx="914400" cy="304800"/>
           </a:xfrm>
           <a:prstGeom prst="parallelogram">
@@ -5578,7 +5491,7 @@
         </p:nvSpPr>
         <p:spPr bwMode="auto">
           <a:xfrm>
-            <a:off x="3799674" y="2710933"/>
+            <a:off x="3875874" y="3015733"/>
             <a:ext cx="0" cy="304800"/>
           </a:xfrm>
           <a:prstGeom prst="line">
@@ -5621,7 +5534,7 @@
         </p:nvSpPr>
         <p:spPr bwMode="auto">
           <a:xfrm>
-            <a:off x="4187213" y="3066073"/>
+            <a:off x="4263413" y="3370873"/>
             <a:ext cx="304800" cy="0"/>
           </a:xfrm>
           <a:prstGeom prst="line">
@@ -5672,7 +5585,7 @@
         </p:nvSpPr>
         <p:spPr bwMode="auto">
           <a:xfrm>
-            <a:off x="4309675" y="3066073"/>
+            <a:off x="4385875" y="3370873"/>
             <a:ext cx="0" cy="457200"/>
           </a:xfrm>
           <a:prstGeom prst="line">
@@ -5723,7 +5636,7 @@
         </p:nvSpPr>
         <p:spPr bwMode="auto">
           <a:xfrm>
-            <a:off x="3345028" y="2908231"/>
+            <a:off x="3421228" y="3213031"/>
             <a:ext cx="914400" cy="304800"/>
           </a:xfrm>
           <a:prstGeom prst="parallelogram">
@@ -5783,7 +5696,7 @@
         </p:nvSpPr>
         <p:spPr bwMode="auto">
           <a:xfrm>
-            <a:off x="4398900" y="2913673"/>
+            <a:off x="4475100" y="3218473"/>
             <a:ext cx="838200" cy="304800"/>
           </a:xfrm>
           <a:prstGeom prst="rect">
@@ -5819,22 +5732,14 @@
           <a:p>
             <a:pPr algn="ctr"/>
             <a:r>
-              <a:rPr lang="en-US" altLang="en-US" sz="1000">
+              <a:rPr lang="en-US" altLang="en-US" sz="1000" dirty="0" err="1" smtClean="0">
                 <a:latin typeface="Tahoma" panose="020B0604030504040204" pitchFamily="34" charset="0"/>
               </a:rPr>
-              <a:t>Tekst</a:t>
-            </a:r>
-            <a:br>
-              <a:rPr lang="en-US" altLang="en-US" sz="1000">
-                <a:latin typeface="Tahoma" panose="020B0604030504040204" pitchFamily="34" charset="0"/>
-              </a:rPr>
-            </a:br>
-            <a:r>
-              <a:rPr lang="en-US" altLang="en-US" sz="1000">
-                <a:latin typeface="Tahoma" panose="020B0604030504040204" pitchFamily="34" charset="0"/>
-              </a:rPr>
-              <a:t>Tool</a:t>
-            </a:r>
+              <a:t>TekstTool</a:t>
+            </a:r>
+            <a:endParaRPr lang="en-US" altLang="en-US" sz="1000" dirty="0">
+              <a:latin typeface="Tahoma" panose="020B0604030504040204" pitchFamily="34" charset="0"/>
+            </a:endParaRPr>
           </a:p>
         </p:txBody>
       </p:sp>
@@ -5848,7 +5753,7 @@
         </p:nvSpPr>
         <p:spPr bwMode="auto">
           <a:xfrm>
-            <a:off x="4628985" y="3826117"/>
+            <a:off x="4705185" y="4130917"/>
             <a:ext cx="940256" cy="304800"/>
           </a:xfrm>
           <a:prstGeom prst="rect">
@@ -5902,7 +5807,7 @@
         </p:nvSpPr>
         <p:spPr bwMode="auto">
           <a:xfrm>
-            <a:off x="4401886" y="2406133"/>
+            <a:off x="4478086" y="2710933"/>
             <a:ext cx="828675" cy="304800"/>
           </a:xfrm>
           <a:prstGeom prst="rect">
@@ -5956,7 +5861,7 @@
         </p:nvSpPr>
         <p:spPr bwMode="auto">
           <a:xfrm>
-            <a:off x="4392361" y="1771652"/>
+            <a:off x="4468561" y="2076452"/>
             <a:ext cx="838200" cy="304800"/>
           </a:xfrm>
           <a:prstGeom prst="rect">
@@ -6013,7 +5918,7 @@
         </p:nvSpPr>
         <p:spPr bwMode="auto">
           <a:xfrm>
-            <a:off x="4637171" y="4263208"/>
+            <a:off x="4713371" y="4568008"/>
             <a:ext cx="940256" cy="304800"/>
           </a:xfrm>
           <a:prstGeom prst="rect">
@@ -6070,7 +5975,7 @@
         </p:nvSpPr>
         <p:spPr bwMode="auto">
           <a:xfrm>
-            <a:off x="4626862" y="4710882"/>
+            <a:off x="4703062" y="5015682"/>
             <a:ext cx="940256" cy="304800"/>
           </a:xfrm>
           <a:prstGeom prst="rect">
@@ -6144,7 +6049,7 @@
         </p:nvSpPr>
         <p:spPr bwMode="auto">
           <a:xfrm>
-            <a:off x="4333812" y="3370873"/>
+            <a:off x="4410012" y="3675673"/>
             <a:ext cx="922338" cy="304800"/>
           </a:xfrm>
           <a:prstGeom prst="parallelogram">
@@ -6217,7 +6122,7 @@
         </p:nvSpPr>
         <p:spPr bwMode="auto">
           <a:xfrm>
-            <a:off x="4309674" y="3523273"/>
+            <a:off x="4385874" y="3828073"/>
             <a:ext cx="89225" cy="0"/>
           </a:xfrm>
           <a:prstGeom prst="line">
@@ -6268,7 +6173,7 @@
         </p:nvSpPr>
         <p:spPr bwMode="auto">
           <a:xfrm>
-            <a:off x="4475100" y="3675672"/>
+            <a:off x="4551300" y="3980472"/>
             <a:ext cx="15076" cy="1997442"/>
           </a:xfrm>
           <a:prstGeom prst="line">
@@ -6319,7 +6224,7 @@
         </p:nvSpPr>
         <p:spPr bwMode="auto">
           <a:xfrm>
-            <a:off x="4484771" y="4415608"/>
+            <a:off x="4560971" y="4720408"/>
             <a:ext cx="152400" cy="0"/>
           </a:xfrm>
           <a:prstGeom prst="line">
@@ -6370,7 +6275,7 @@
         </p:nvSpPr>
         <p:spPr bwMode="auto">
           <a:xfrm>
-            <a:off x="4629249" y="5124449"/>
+            <a:off x="4705449" y="5429249"/>
             <a:ext cx="940256" cy="304800"/>
           </a:xfrm>
           <a:prstGeom prst="rect">
@@ -6427,7 +6332,7 @@
         </p:nvSpPr>
         <p:spPr bwMode="auto">
           <a:xfrm>
-            <a:off x="4476849" y="5276849"/>
+            <a:off x="4553049" y="5581649"/>
             <a:ext cx="152400" cy="0"/>
           </a:xfrm>
           <a:prstGeom prst="line">
@@ -6478,7 +6383,7 @@
         </p:nvSpPr>
         <p:spPr bwMode="auto">
           <a:xfrm>
-            <a:off x="4626862" y="5520714"/>
+            <a:off x="4703062" y="5825514"/>
             <a:ext cx="940256" cy="304800"/>
           </a:xfrm>
           <a:prstGeom prst="rect">
@@ -6535,7 +6440,7 @@
         </p:nvSpPr>
         <p:spPr bwMode="auto">
           <a:xfrm>
-            <a:off x="4474462" y="5673114"/>
+            <a:off x="4550662" y="5977914"/>
             <a:ext cx="152400" cy="0"/>
           </a:xfrm>
           <a:prstGeom prst="line">
@@ -6586,7 +6491,7 @@
         </p:nvSpPr>
         <p:spPr bwMode="auto">
           <a:xfrm>
-            <a:off x="6853015" y="2557756"/>
+            <a:off x="6929215" y="2862556"/>
             <a:ext cx="314325" cy="0"/>
           </a:xfrm>
           <a:prstGeom prst="line">
@@ -6637,7 +6542,7 @@
         </p:nvSpPr>
         <p:spPr bwMode="auto">
           <a:xfrm>
-            <a:off x="5795726" y="2405356"/>
+            <a:off x="5871926" y="2710156"/>
             <a:ext cx="1133489" cy="304800"/>
           </a:xfrm>
           <a:prstGeom prst="parallelogram">
@@ -6697,7 +6602,7 @@
         </p:nvSpPr>
         <p:spPr bwMode="auto">
           <a:xfrm>
-            <a:off x="6472015" y="2710156"/>
+            <a:off x="6548215" y="3014956"/>
             <a:ext cx="0" cy="304800"/>
           </a:xfrm>
           <a:prstGeom prst="line">
@@ -6740,7 +6645,7 @@
         </p:nvSpPr>
         <p:spPr bwMode="auto">
           <a:xfrm>
-            <a:off x="6833316" y="3066073"/>
+            <a:off x="6909516" y="3370873"/>
             <a:ext cx="304800" cy="0"/>
           </a:xfrm>
           <a:prstGeom prst="line">
@@ -6791,7 +6696,7 @@
         </p:nvSpPr>
         <p:spPr bwMode="auto">
           <a:xfrm>
-            <a:off x="6955778" y="3066073"/>
+            <a:off x="7031978" y="3370873"/>
             <a:ext cx="0" cy="457200"/>
           </a:xfrm>
           <a:prstGeom prst="line">
@@ -6842,7 +6747,7 @@
         </p:nvSpPr>
         <p:spPr bwMode="auto">
           <a:xfrm flipV="1">
-            <a:off x="7121203" y="3978919"/>
+            <a:off x="7197403" y="4283719"/>
             <a:ext cx="197012" cy="1553"/>
           </a:xfrm>
           <a:prstGeom prst="line">
@@ -6893,7 +6798,7 @@
         </p:nvSpPr>
         <p:spPr bwMode="auto">
           <a:xfrm>
-            <a:off x="5772042" y="2908231"/>
+            <a:off x="5848242" y="3213031"/>
             <a:ext cx="1133489" cy="304800"/>
           </a:xfrm>
           <a:prstGeom prst="parallelogram">
@@ -6953,7 +6858,7 @@
         </p:nvSpPr>
         <p:spPr bwMode="auto">
           <a:xfrm>
-            <a:off x="7045003" y="2913673"/>
+            <a:off x="7121203" y="3218473"/>
             <a:ext cx="838200" cy="304800"/>
           </a:xfrm>
           <a:prstGeom prst="rect">
@@ -7010,7 +6915,7 @@
         </p:nvSpPr>
         <p:spPr bwMode="auto">
           <a:xfrm>
-            <a:off x="7273603" y="3828073"/>
+            <a:off x="7349803" y="4132873"/>
             <a:ext cx="1102960" cy="304800"/>
           </a:xfrm>
           <a:prstGeom prst="rect">
@@ -7067,7 +6972,7 @@
         </p:nvSpPr>
         <p:spPr bwMode="auto">
           <a:xfrm>
-            <a:off x="7074227" y="2405356"/>
+            <a:off x="7150427" y="2710156"/>
             <a:ext cx="828675" cy="304800"/>
           </a:xfrm>
           <a:prstGeom prst="rect">
@@ -7124,7 +7029,7 @@
         </p:nvSpPr>
         <p:spPr bwMode="auto">
           <a:xfrm>
-            <a:off x="7271632" y="4260495"/>
+            <a:off x="7347832" y="4565295"/>
             <a:ext cx="1102960" cy="304800"/>
           </a:xfrm>
           <a:prstGeom prst="rect">
@@ -7181,7 +7086,7 @@
         </p:nvSpPr>
         <p:spPr bwMode="auto">
           <a:xfrm>
-            <a:off x="7280756" y="4709917"/>
+            <a:off x="7356956" y="5014717"/>
             <a:ext cx="1102960" cy="304800"/>
           </a:xfrm>
           <a:prstGeom prst="rect">
@@ -7255,7 +7160,7 @@
         </p:nvSpPr>
         <p:spPr bwMode="auto">
           <a:xfrm>
-            <a:off x="6968803" y="3370873"/>
+            <a:off x="7045003" y="3675673"/>
             <a:ext cx="922338" cy="304800"/>
           </a:xfrm>
           <a:prstGeom prst="parallelogram">
@@ -7331,7 +7236,7 @@
         </p:nvSpPr>
         <p:spPr bwMode="auto">
           <a:xfrm>
-            <a:off x="6955777" y="3523273"/>
+            <a:off x="7031977" y="3828073"/>
             <a:ext cx="89225" cy="0"/>
           </a:xfrm>
           <a:prstGeom prst="line">
@@ -7382,7 +7287,7 @@
         </p:nvSpPr>
         <p:spPr bwMode="auto">
           <a:xfrm>
-            <a:off x="7121201" y="3675672"/>
+            <a:off x="7197401" y="3980472"/>
             <a:ext cx="11311" cy="1636068"/>
           </a:xfrm>
           <a:prstGeom prst="line">
@@ -7433,7 +7338,7 @@
         </p:nvSpPr>
         <p:spPr bwMode="auto">
           <a:xfrm>
-            <a:off x="7119232" y="4411335"/>
+            <a:off x="7195432" y="4716135"/>
             <a:ext cx="152400" cy="0"/>
           </a:xfrm>
           <a:prstGeom prst="line">
@@ -7484,7 +7389,7 @@
         </p:nvSpPr>
         <p:spPr bwMode="auto">
           <a:xfrm>
-            <a:off x="7128356" y="4862317"/>
+            <a:off x="7204556" y="5167117"/>
             <a:ext cx="152400" cy="0"/>
           </a:xfrm>
           <a:prstGeom prst="line">
@@ -7535,7 +7440,7 @@
         </p:nvSpPr>
         <p:spPr bwMode="auto">
           <a:xfrm>
-            <a:off x="7279007" y="5159339"/>
+            <a:off x="7355207" y="5464139"/>
             <a:ext cx="1102960" cy="304800"/>
           </a:xfrm>
           <a:prstGeom prst="rect">
@@ -7592,7 +7497,7 @@
         </p:nvSpPr>
         <p:spPr bwMode="auto">
           <a:xfrm>
-            <a:off x="7124859" y="5311739"/>
+            <a:off x="7201059" y="5616539"/>
             <a:ext cx="152400" cy="0"/>
           </a:xfrm>
           <a:prstGeom prst="line">
@@ -7643,7 +7548,7 @@
         </p:nvSpPr>
         <p:spPr bwMode="auto">
           <a:xfrm>
-            <a:off x="5706237" y="1524000"/>
+            <a:off x="5782437" y="1828800"/>
             <a:ext cx="3015166" cy="4384997"/>
           </a:xfrm>
           <a:prstGeom prst="roundRect">
@@ -7699,8 +7604,8 @@
         </p:nvSpPr>
         <p:spPr bwMode="auto">
           <a:xfrm>
-            <a:off x="3278395" y="838200"/>
-            <a:ext cx="2388754" cy="5070797"/>
+            <a:off x="3354595" y="457200"/>
+            <a:ext cx="2388754" cy="5756597"/>
           </a:xfrm>
           <a:prstGeom prst="roundRect">
             <a:avLst>
@@ -7755,7 +7660,7 @@
         </p:nvSpPr>
         <p:spPr bwMode="auto">
           <a:xfrm>
-            <a:off x="3357469" y="890675"/>
+            <a:off x="3440468" y="515802"/>
             <a:ext cx="1524000" cy="152400"/>
           </a:xfrm>
           <a:prstGeom prst="rect">
@@ -7828,7 +7733,7 @@
         </p:nvSpPr>
         <p:spPr bwMode="auto">
           <a:xfrm>
-            <a:off x="5795726" y="1592238"/>
+            <a:off x="5871926" y="1897038"/>
             <a:ext cx="1524000" cy="152400"/>
           </a:xfrm>
           <a:prstGeom prst="rect">
@@ -7901,7 +7806,7 @@
         </p:nvSpPr>
         <p:spPr bwMode="auto">
           <a:xfrm>
-            <a:off x="2057400" y="1573564"/>
+            <a:off x="2133600" y="1878364"/>
             <a:ext cx="1181907" cy="153888"/>
           </a:xfrm>
           <a:prstGeom prst="rect">
@@ -7974,7 +7879,7 @@
         </p:nvSpPr>
         <p:spPr bwMode="auto">
           <a:xfrm>
-            <a:off x="7393100" y="5667175"/>
+            <a:off x="7469300" y="5971975"/>
             <a:ext cx="152400" cy="0"/>
           </a:xfrm>
           <a:prstGeom prst="line">
@@ -8025,7 +7930,7 @@
         </p:nvSpPr>
         <p:spPr bwMode="auto">
           <a:xfrm>
-            <a:off x="7529839" y="5524108"/>
+            <a:off x="7606039" y="5828908"/>
             <a:ext cx="1102960" cy="304800"/>
           </a:xfrm>
           <a:prstGeom prst="rect">
@@ -8082,7 +7987,7 @@
         </p:nvSpPr>
         <p:spPr bwMode="auto">
           <a:xfrm>
-            <a:off x="4399917" y="1391465"/>
+            <a:off x="4476117" y="1696265"/>
             <a:ext cx="838200" cy="304800"/>
           </a:xfrm>
           <a:prstGeom prst="rect">
@@ -8139,7 +8044,7 @@
         </p:nvSpPr>
         <p:spPr bwMode="auto">
           <a:xfrm>
-            <a:off x="4399917" y="1002761"/>
+            <a:off x="4476117" y="1307561"/>
             <a:ext cx="838200" cy="304800"/>
           </a:xfrm>
           <a:prstGeom prst="rect">
@@ -8178,7 +8083,7 @@
               <a:rPr lang="en-US" altLang="en-US" sz="1000" dirty="0" err="1" smtClean="0">
                 <a:latin typeface="Tahoma" panose="020B0604030504040204" pitchFamily="34" charset="0"/>
               </a:rPr>
-              <a:t>PickerTool</a:t>
+              <a:t>PipetTool</a:t>
             </a:r>
             <a:endParaRPr lang="en-US" altLang="en-US" sz="1000" dirty="0">
               <a:latin typeface="Tahoma" panose="020B0604030504040204" pitchFamily="34" charset="0"/>
@@ -8196,7 +8101,7 @@
         </p:nvSpPr>
         <p:spPr bwMode="auto">
           <a:xfrm>
-            <a:off x="2181224" y="2580036"/>
+            <a:off x="2257424" y="2884836"/>
             <a:ext cx="956079" cy="304800"/>
           </a:xfrm>
           <a:prstGeom prst="rect">
@@ -8253,7 +8158,7 @@
         </p:nvSpPr>
         <p:spPr bwMode="auto">
           <a:xfrm>
-            <a:off x="2181225" y="5042708"/>
+            <a:off x="2257425" y="5347508"/>
             <a:ext cx="948926" cy="304800"/>
           </a:xfrm>
           <a:prstGeom prst="rect">
@@ -8297,6 +8202,762 @@
             <a:endParaRPr lang="en-US" altLang="en-US" sz="1000" dirty="0">
               <a:latin typeface="Tahoma" panose="020B0604030504040204" pitchFamily="34" charset="0"/>
             </a:endParaRPr>
+          </a:p>
+        </p:txBody>
+      </p:sp>
+      <p:sp>
+        <p:nvSpPr>
+          <p:cNvPr id="82" name="Line 12"/>
+          <p:cNvSpPr>
+            <a:spLocks noChangeShapeType="1"/>
+          </p:cNvSpPr>
+          <p:nvPr/>
+        </p:nvSpPr>
+        <p:spPr bwMode="auto">
+          <a:xfrm flipV="1">
+            <a:off x="4094747" y="1057068"/>
+            <a:ext cx="442458" cy="0"/>
+          </a:xfrm>
+          <a:prstGeom prst="line">
+            <a:avLst/>
+          </a:prstGeom>
+          <a:noFill/>
+          <a:ln w="25400">
+            <a:solidFill>
+              <a:schemeClr val="tx1"/>
+            </a:solidFill>
+            <a:prstDash val="sysDot"/>
+            <a:round/>
+            <a:headEnd/>
+            <a:tailEnd/>
+          </a:ln>
+          <a:effectLst/>
+          <a:extLst>
+            <a:ext uri="{909E8E84-426E-40DD-AFC4-6F175D3DCCD1}">
+              <a14:hiddenFill xmlns:a14="http://schemas.microsoft.com/office/drawing/2010/main">
+                <a:noFill/>
+              </a14:hiddenFill>
+            </a:ext>
+            <a:ext uri="{AF507438-7753-43E0-B8FC-AC1667EBCBE1}">
+              <a14:hiddenEffects xmlns:a14="http://schemas.microsoft.com/office/drawing/2010/main">
+                <a:effectLst>
+                  <a:outerShdw dist="35921" dir="2700000" algn="ctr" rotWithShape="0">
+                    <a:schemeClr val="bg2"/>
+                  </a:outerShdw>
+                </a:effectLst>
+              </a14:hiddenEffects>
+            </a:ext>
+          </a:extLst>
+        </p:spPr>
+        <p:txBody>
+          <a:bodyPr/>
+          <a:lstStyle>
+            <a:defPPr>
+              <a:defRPr lang="en-US"/>
+            </a:defPPr>
+            <a:lvl1pPr algn="l" rtl="0" fontAlgn="base">
+              <a:spcBef>
+                <a:spcPct val="0"/>
+              </a:spcBef>
+              <a:spcAft>
+                <a:spcPct val="0"/>
+              </a:spcAft>
+              <a:defRPr kern="1200">
+                <a:solidFill>
+                  <a:schemeClr val="tx1"/>
+                </a:solidFill>
+                <a:latin typeface="Arial" panose="020B0604020202020204" pitchFamily="34" charset="0"/>
+                <a:ea typeface="+mn-ea"/>
+                <a:cs typeface="+mn-cs"/>
+              </a:defRPr>
+            </a:lvl1pPr>
+            <a:lvl2pPr marL="457200" algn="l" rtl="0" fontAlgn="base">
+              <a:spcBef>
+                <a:spcPct val="0"/>
+              </a:spcBef>
+              <a:spcAft>
+                <a:spcPct val="0"/>
+              </a:spcAft>
+              <a:defRPr kern="1200">
+                <a:solidFill>
+                  <a:schemeClr val="tx1"/>
+                </a:solidFill>
+                <a:latin typeface="Arial" panose="020B0604020202020204" pitchFamily="34" charset="0"/>
+                <a:ea typeface="+mn-ea"/>
+                <a:cs typeface="+mn-cs"/>
+              </a:defRPr>
+            </a:lvl2pPr>
+            <a:lvl3pPr marL="914400" algn="l" rtl="0" fontAlgn="base">
+              <a:spcBef>
+                <a:spcPct val="0"/>
+              </a:spcBef>
+              <a:spcAft>
+                <a:spcPct val="0"/>
+              </a:spcAft>
+              <a:defRPr kern="1200">
+                <a:solidFill>
+                  <a:schemeClr val="tx1"/>
+                </a:solidFill>
+                <a:latin typeface="Arial" panose="020B0604020202020204" pitchFamily="34" charset="0"/>
+                <a:ea typeface="+mn-ea"/>
+                <a:cs typeface="+mn-cs"/>
+              </a:defRPr>
+            </a:lvl3pPr>
+            <a:lvl4pPr marL="1371600" algn="l" rtl="0" fontAlgn="base">
+              <a:spcBef>
+                <a:spcPct val="0"/>
+              </a:spcBef>
+              <a:spcAft>
+                <a:spcPct val="0"/>
+              </a:spcAft>
+              <a:defRPr kern="1200">
+                <a:solidFill>
+                  <a:schemeClr val="tx1"/>
+                </a:solidFill>
+                <a:latin typeface="Arial" panose="020B0604020202020204" pitchFamily="34" charset="0"/>
+                <a:ea typeface="+mn-ea"/>
+                <a:cs typeface="+mn-cs"/>
+              </a:defRPr>
+            </a:lvl4pPr>
+            <a:lvl5pPr marL="1828800" algn="l" rtl="0" fontAlgn="base">
+              <a:spcBef>
+                <a:spcPct val="0"/>
+              </a:spcBef>
+              <a:spcAft>
+                <a:spcPct val="0"/>
+              </a:spcAft>
+              <a:defRPr kern="1200">
+                <a:solidFill>
+                  <a:schemeClr val="tx1"/>
+                </a:solidFill>
+                <a:latin typeface="Arial" panose="020B0604020202020204" pitchFamily="34" charset="0"/>
+                <a:ea typeface="+mn-ea"/>
+                <a:cs typeface="+mn-cs"/>
+              </a:defRPr>
+            </a:lvl5pPr>
+            <a:lvl6pPr marL="2286000" algn="l" defTabSz="914400" rtl="0" eaLnBrk="1" latinLnBrk="0" hangingPunct="1">
+              <a:defRPr kern="1200">
+                <a:solidFill>
+                  <a:schemeClr val="tx1"/>
+                </a:solidFill>
+                <a:latin typeface="Arial" panose="020B0604020202020204" pitchFamily="34" charset="0"/>
+                <a:ea typeface="+mn-ea"/>
+                <a:cs typeface="+mn-cs"/>
+              </a:defRPr>
+            </a:lvl6pPr>
+            <a:lvl7pPr marL="2743200" algn="l" defTabSz="914400" rtl="0" eaLnBrk="1" latinLnBrk="0" hangingPunct="1">
+              <a:defRPr kern="1200">
+                <a:solidFill>
+                  <a:schemeClr val="tx1"/>
+                </a:solidFill>
+                <a:latin typeface="Arial" panose="020B0604020202020204" pitchFamily="34" charset="0"/>
+                <a:ea typeface="+mn-ea"/>
+                <a:cs typeface="+mn-cs"/>
+              </a:defRPr>
+            </a:lvl7pPr>
+            <a:lvl8pPr marL="3200400" algn="l" defTabSz="914400" rtl="0" eaLnBrk="1" latinLnBrk="0" hangingPunct="1">
+              <a:defRPr kern="1200">
+                <a:solidFill>
+                  <a:schemeClr val="tx1"/>
+                </a:solidFill>
+                <a:latin typeface="Arial" panose="020B0604020202020204" pitchFamily="34" charset="0"/>
+                <a:ea typeface="+mn-ea"/>
+                <a:cs typeface="+mn-cs"/>
+              </a:defRPr>
+            </a:lvl8pPr>
+            <a:lvl9pPr marL="3657600" algn="l" defTabSz="914400" rtl="0" eaLnBrk="1" latinLnBrk="0" hangingPunct="1">
+              <a:defRPr kern="1200">
+                <a:solidFill>
+                  <a:schemeClr val="tx1"/>
+                </a:solidFill>
+                <a:latin typeface="Arial" panose="020B0604020202020204" pitchFamily="34" charset="0"/>
+                <a:ea typeface="+mn-ea"/>
+                <a:cs typeface="+mn-cs"/>
+              </a:defRPr>
+            </a:lvl9pPr>
+          </a:lstStyle>
+          <a:p>
+            <a:endParaRPr lang="en-US"/>
+          </a:p>
+        </p:txBody>
+      </p:sp>
+      <p:sp>
+        <p:nvSpPr>
+          <p:cNvPr id="83" name="Rectangle 8"/>
+          <p:cNvSpPr>
+            <a:spLocks noChangeArrowheads="1"/>
+          </p:cNvSpPr>
+          <p:nvPr/>
+        </p:nvSpPr>
+        <p:spPr bwMode="auto">
+          <a:xfrm>
+            <a:off x="4468561" y="916829"/>
+            <a:ext cx="838200" cy="304800"/>
+          </a:xfrm>
+          <a:prstGeom prst="rect">
+            <a:avLst/>
+          </a:prstGeom>
+          <a:solidFill>
+            <a:srgbClr val="FFFF00"/>
+          </a:solidFill>
+          <a:ln w="9525">
+            <a:solidFill>
+              <a:schemeClr val="tx1"/>
+            </a:solidFill>
+            <a:miter lim="800000"/>
+            <a:headEnd/>
+            <a:tailEnd/>
+          </a:ln>
+          <a:effectLst/>
+          <a:extLst>
+            <a:ext uri="{AF507438-7753-43E0-B8FC-AC1667EBCBE1}">
+              <a14:hiddenEffects xmlns:a14="http://schemas.microsoft.com/office/drawing/2010/main">
+                <a:effectLst>
+                  <a:outerShdw dist="35921" dir="2700000" algn="ctr" rotWithShape="0">
+                    <a:schemeClr val="bg2"/>
+                  </a:outerShdw>
+                </a:effectLst>
+              </a14:hiddenEffects>
+            </a:ext>
+          </a:extLst>
+        </p:spPr>
+        <p:txBody>
+          <a:bodyPr wrap="none" anchor="ctr"/>
+          <a:lstStyle/>
+          <a:p>
+            <a:pPr algn="ctr"/>
+            <a:r>
+              <a:rPr lang="en-US" altLang="en-US" sz="1000" dirty="0" err="1" smtClean="0">
+                <a:latin typeface="Tahoma" panose="020B0604030504040204" pitchFamily="34" charset="0"/>
+              </a:rPr>
+              <a:t>MoverTool</a:t>
+            </a:r>
+            <a:endParaRPr lang="en-US" altLang="en-US" sz="1000" dirty="0">
+              <a:latin typeface="Tahoma" panose="020B0604030504040204" pitchFamily="34" charset="0"/>
+            </a:endParaRPr>
+          </a:p>
+        </p:txBody>
+      </p:sp>
+      <p:sp>
+        <p:nvSpPr>
+          <p:cNvPr id="84" name="Line 12"/>
+          <p:cNvSpPr>
+            <a:spLocks noChangeShapeType="1"/>
+          </p:cNvSpPr>
+          <p:nvPr/>
+        </p:nvSpPr>
+        <p:spPr bwMode="auto">
+          <a:xfrm flipV="1">
+            <a:off x="4102303" y="685800"/>
+            <a:ext cx="442458" cy="0"/>
+          </a:xfrm>
+          <a:prstGeom prst="line">
+            <a:avLst/>
+          </a:prstGeom>
+          <a:noFill/>
+          <a:ln w="25400">
+            <a:solidFill>
+              <a:schemeClr val="tx1"/>
+            </a:solidFill>
+            <a:prstDash val="sysDot"/>
+            <a:round/>
+            <a:headEnd/>
+            <a:tailEnd/>
+          </a:ln>
+          <a:effectLst/>
+          <a:extLst>
+            <a:ext uri="{909E8E84-426E-40DD-AFC4-6F175D3DCCD1}">
+              <a14:hiddenFill xmlns:a14="http://schemas.microsoft.com/office/drawing/2010/main">
+                <a:noFill/>
+              </a14:hiddenFill>
+            </a:ext>
+            <a:ext uri="{AF507438-7753-43E0-B8FC-AC1667EBCBE1}">
+              <a14:hiddenEffects xmlns:a14="http://schemas.microsoft.com/office/drawing/2010/main">
+                <a:effectLst>
+                  <a:outerShdw dist="35921" dir="2700000" algn="ctr" rotWithShape="0">
+                    <a:schemeClr val="bg2"/>
+                  </a:outerShdw>
+                </a:effectLst>
+              </a14:hiddenEffects>
+            </a:ext>
+          </a:extLst>
+        </p:spPr>
+        <p:txBody>
+          <a:bodyPr/>
+          <a:lstStyle>
+            <a:defPPr>
+              <a:defRPr lang="en-US"/>
+            </a:defPPr>
+            <a:lvl1pPr algn="l" rtl="0" fontAlgn="base">
+              <a:spcBef>
+                <a:spcPct val="0"/>
+              </a:spcBef>
+              <a:spcAft>
+                <a:spcPct val="0"/>
+              </a:spcAft>
+              <a:defRPr kern="1200">
+                <a:solidFill>
+                  <a:schemeClr val="tx1"/>
+                </a:solidFill>
+                <a:latin typeface="Arial" panose="020B0604020202020204" pitchFamily="34" charset="0"/>
+                <a:ea typeface="+mn-ea"/>
+                <a:cs typeface="+mn-cs"/>
+              </a:defRPr>
+            </a:lvl1pPr>
+            <a:lvl2pPr marL="457200" algn="l" rtl="0" fontAlgn="base">
+              <a:spcBef>
+                <a:spcPct val="0"/>
+              </a:spcBef>
+              <a:spcAft>
+                <a:spcPct val="0"/>
+              </a:spcAft>
+              <a:defRPr kern="1200">
+                <a:solidFill>
+                  <a:schemeClr val="tx1"/>
+                </a:solidFill>
+                <a:latin typeface="Arial" panose="020B0604020202020204" pitchFamily="34" charset="0"/>
+                <a:ea typeface="+mn-ea"/>
+                <a:cs typeface="+mn-cs"/>
+              </a:defRPr>
+            </a:lvl2pPr>
+            <a:lvl3pPr marL="914400" algn="l" rtl="0" fontAlgn="base">
+              <a:spcBef>
+                <a:spcPct val="0"/>
+              </a:spcBef>
+              <a:spcAft>
+                <a:spcPct val="0"/>
+              </a:spcAft>
+              <a:defRPr kern="1200">
+                <a:solidFill>
+                  <a:schemeClr val="tx1"/>
+                </a:solidFill>
+                <a:latin typeface="Arial" panose="020B0604020202020204" pitchFamily="34" charset="0"/>
+                <a:ea typeface="+mn-ea"/>
+                <a:cs typeface="+mn-cs"/>
+              </a:defRPr>
+            </a:lvl3pPr>
+            <a:lvl4pPr marL="1371600" algn="l" rtl="0" fontAlgn="base">
+              <a:spcBef>
+                <a:spcPct val="0"/>
+              </a:spcBef>
+              <a:spcAft>
+                <a:spcPct val="0"/>
+              </a:spcAft>
+              <a:defRPr kern="1200">
+                <a:solidFill>
+                  <a:schemeClr val="tx1"/>
+                </a:solidFill>
+                <a:latin typeface="Arial" panose="020B0604020202020204" pitchFamily="34" charset="0"/>
+                <a:ea typeface="+mn-ea"/>
+                <a:cs typeface="+mn-cs"/>
+              </a:defRPr>
+            </a:lvl4pPr>
+            <a:lvl5pPr marL="1828800" algn="l" rtl="0" fontAlgn="base">
+              <a:spcBef>
+                <a:spcPct val="0"/>
+              </a:spcBef>
+              <a:spcAft>
+                <a:spcPct val="0"/>
+              </a:spcAft>
+              <a:defRPr kern="1200">
+                <a:solidFill>
+                  <a:schemeClr val="tx1"/>
+                </a:solidFill>
+                <a:latin typeface="Arial" panose="020B0604020202020204" pitchFamily="34" charset="0"/>
+                <a:ea typeface="+mn-ea"/>
+                <a:cs typeface="+mn-cs"/>
+              </a:defRPr>
+            </a:lvl5pPr>
+            <a:lvl6pPr marL="2286000" algn="l" defTabSz="914400" rtl="0" eaLnBrk="1" latinLnBrk="0" hangingPunct="1">
+              <a:defRPr kern="1200">
+                <a:solidFill>
+                  <a:schemeClr val="tx1"/>
+                </a:solidFill>
+                <a:latin typeface="Arial" panose="020B0604020202020204" pitchFamily="34" charset="0"/>
+                <a:ea typeface="+mn-ea"/>
+                <a:cs typeface="+mn-cs"/>
+              </a:defRPr>
+            </a:lvl6pPr>
+            <a:lvl7pPr marL="2743200" algn="l" defTabSz="914400" rtl="0" eaLnBrk="1" latinLnBrk="0" hangingPunct="1">
+              <a:defRPr kern="1200">
+                <a:solidFill>
+                  <a:schemeClr val="tx1"/>
+                </a:solidFill>
+                <a:latin typeface="Arial" panose="020B0604020202020204" pitchFamily="34" charset="0"/>
+                <a:ea typeface="+mn-ea"/>
+                <a:cs typeface="+mn-cs"/>
+              </a:defRPr>
+            </a:lvl7pPr>
+            <a:lvl8pPr marL="3200400" algn="l" defTabSz="914400" rtl="0" eaLnBrk="1" latinLnBrk="0" hangingPunct="1">
+              <a:defRPr kern="1200">
+                <a:solidFill>
+                  <a:schemeClr val="tx1"/>
+                </a:solidFill>
+                <a:latin typeface="Arial" panose="020B0604020202020204" pitchFamily="34" charset="0"/>
+                <a:ea typeface="+mn-ea"/>
+                <a:cs typeface="+mn-cs"/>
+              </a:defRPr>
+            </a:lvl8pPr>
+            <a:lvl9pPr marL="3657600" algn="l" defTabSz="914400" rtl="0" eaLnBrk="1" latinLnBrk="0" hangingPunct="1">
+              <a:defRPr kern="1200">
+                <a:solidFill>
+                  <a:schemeClr val="tx1"/>
+                </a:solidFill>
+                <a:latin typeface="Arial" panose="020B0604020202020204" pitchFamily="34" charset="0"/>
+                <a:ea typeface="+mn-ea"/>
+                <a:cs typeface="+mn-cs"/>
+              </a:defRPr>
+            </a:lvl9pPr>
+          </a:lstStyle>
+          <a:p>
+            <a:endParaRPr lang="en-US"/>
+          </a:p>
+        </p:txBody>
+      </p:sp>
+      <p:sp>
+        <p:nvSpPr>
+          <p:cNvPr id="85" name="Rectangle 8"/>
+          <p:cNvSpPr>
+            <a:spLocks noChangeArrowheads="1"/>
+          </p:cNvSpPr>
+          <p:nvPr/>
+        </p:nvSpPr>
+        <p:spPr bwMode="auto">
+          <a:xfrm>
+            <a:off x="4476117" y="545561"/>
+            <a:ext cx="838200" cy="304800"/>
+          </a:xfrm>
+          <a:prstGeom prst="rect">
+            <a:avLst/>
+          </a:prstGeom>
+          <a:solidFill>
+            <a:srgbClr val="FFFF00"/>
+          </a:solidFill>
+          <a:ln w="9525">
+            <a:solidFill>
+              <a:schemeClr val="tx1"/>
+            </a:solidFill>
+            <a:miter lim="800000"/>
+            <a:headEnd/>
+            <a:tailEnd/>
+          </a:ln>
+          <a:effectLst/>
+          <a:extLst>
+            <a:ext uri="{AF507438-7753-43E0-B8FC-AC1667EBCBE1}">
+              <a14:hiddenEffects xmlns:a14="http://schemas.microsoft.com/office/drawing/2010/main">
+                <a:effectLst>
+                  <a:outerShdw dist="35921" dir="2700000" algn="ctr" rotWithShape="0">
+                    <a:schemeClr val="bg2"/>
+                  </a:outerShdw>
+                </a:effectLst>
+              </a14:hiddenEffects>
+            </a:ext>
+          </a:extLst>
+        </p:spPr>
+        <p:txBody>
+          <a:bodyPr wrap="none" anchor="ctr"/>
+          <a:lstStyle/>
+          <a:p>
+            <a:pPr algn="ctr"/>
+            <a:r>
+              <a:rPr lang="en-US" altLang="en-US" sz="1000" dirty="0" err="1" smtClean="0">
+                <a:latin typeface="Tahoma" panose="020B0604030504040204" pitchFamily="34" charset="0"/>
+              </a:rPr>
+              <a:t>VerfTool</a:t>
+            </a:r>
+            <a:endParaRPr lang="en-US" altLang="en-US" sz="1000" dirty="0">
+              <a:latin typeface="Tahoma" panose="020B0604030504040204" pitchFamily="34" charset="0"/>
+            </a:endParaRPr>
+          </a:p>
+        </p:txBody>
+      </p:sp>
+      <p:sp>
+        <p:nvSpPr>
+          <p:cNvPr id="88" name="Rectangle 5"/>
+          <p:cNvSpPr>
+            <a:spLocks noChangeArrowheads="1"/>
+          </p:cNvSpPr>
+          <p:nvPr/>
+        </p:nvSpPr>
+        <p:spPr bwMode="auto">
+          <a:xfrm>
+            <a:off x="3432692" y="3695700"/>
+            <a:ext cx="838200" cy="304800"/>
+          </a:xfrm>
+          <a:prstGeom prst="rect">
+            <a:avLst/>
+          </a:prstGeom>
+          <a:solidFill>
+            <a:srgbClr val="FFFF00"/>
+          </a:solidFill>
+          <a:ln w="9525">
+            <a:solidFill>
+              <a:schemeClr val="tx1"/>
+            </a:solidFill>
+            <a:miter lim="800000"/>
+            <a:headEnd/>
+            <a:tailEnd/>
+          </a:ln>
+          <a:effectLst/>
+          <a:extLst>
+            <a:ext uri="{AF507438-7753-43E0-B8FC-AC1667EBCBE1}">
+              <a14:hiddenEffects xmlns:a14="http://schemas.microsoft.com/office/drawing/2010/main">
+                <a:effectLst>
+                  <a:outerShdw dist="35921" dir="2700000" algn="ctr" rotWithShape="0">
+                    <a:schemeClr val="bg2"/>
+                  </a:outerShdw>
+                </a:effectLst>
+              </a14:hiddenEffects>
+            </a:ext>
+          </a:extLst>
+        </p:spPr>
+        <p:txBody>
+          <a:bodyPr wrap="none" anchor="ctr"/>
+          <a:lstStyle/>
+          <a:p>
+            <a:pPr algn="ctr"/>
+            <a:r>
+              <a:rPr lang="en-US" altLang="en-US" sz="1000" dirty="0" err="1" smtClean="0">
+                <a:latin typeface="Tahoma" panose="020B0604030504040204" pitchFamily="34" charset="0"/>
+              </a:rPr>
+              <a:t>ImageTool</a:t>
+            </a:r>
+            <a:endParaRPr lang="en-US" altLang="en-US" sz="1000" dirty="0">
+              <a:latin typeface="Tahoma" panose="020B0604030504040204" pitchFamily="34" charset="0"/>
+            </a:endParaRPr>
+          </a:p>
+        </p:txBody>
+      </p:sp>
+      <p:sp>
+        <p:nvSpPr>
+          <p:cNvPr id="90" name="Rectangle 5"/>
+          <p:cNvSpPr>
+            <a:spLocks noChangeArrowheads="1"/>
+          </p:cNvSpPr>
+          <p:nvPr/>
+        </p:nvSpPr>
+        <p:spPr bwMode="auto">
+          <a:xfrm>
+            <a:off x="5956603" y="3693552"/>
+            <a:ext cx="838200" cy="304800"/>
+          </a:xfrm>
+          <a:prstGeom prst="rect">
+            <a:avLst/>
+          </a:prstGeom>
+          <a:solidFill>
+            <a:srgbClr val="FFFF00"/>
+          </a:solidFill>
+          <a:ln w="9525">
+            <a:solidFill>
+              <a:schemeClr val="tx1"/>
+            </a:solidFill>
+            <a:miter lim="800000"/>
+            <a:headEnd/>
+            <a:tailEnd/>
+          </a:ln>
+          <a:effectLst/>
+          <a:extLst>
+            <a:ext uri="{AF507438-7753-43E0-B8FC-AC1667EBCBE1}">
+              <a14:hiddenEffects xmlns:a14="http://schemas.microsoft.com/office/drawing/2010/main">
+                <a:effectLst>
+                  <a:outerShdw dist="35921" dir="2700000" algn="ctr" rotWithShape="0">
+                    <a:schemeClr val="bg2"/>
+                  </a:outerShdw>
+                </a:effectLst>
+              </a14:hiddenEffects>
+            </a:ext>
+          </a:extLst>
+        </p:spPr>
+        <p:txBody>
+          <a:bodyPr wrap="none" anchor="ctr"/>
+          <a:lstStyle/>
+          <a:p>
+            <a:pPr algn="ctr"/>
+            <a:r>
+              <a:rPr lang="en-US" altLang="en-US" sz="1000" dirty="0" err="1" smtClean="0">
+                <a:latin typeface="Tahoma" panose="020B0604030504040204" pitchFamily="34" charset="0"/>
+              </a:rPr>
+              <a:t>ImageObject</a:t>
+            </a:r>
+            <a:endParaRPr lang="en-US" altLang="en-US" sz="1000" dirty="0">
+              <a:latin typeface="Tahoma" panose="020B0604030504040204" pitchFamily="34" charset="0"/>
+            </a:endParaRPr>
+          </a:p>
+        </p:txBody>
+      </p:sp>
+      <p:sp>
+        <p:nvSpPr>
+          <p:cNvPr id="77" name="Line 12"/>
+          <p:cNvSpPr>
+            <a:spLocks noChangeShapeType="1"/>
+          </p:cNvSpPr>
+          <p:nvPr/>
+        </p:nvSpPr>
+        <p:spPr bwMode="auto">
+          <a:xfrm flipV="1">
+            <a:off x="4092737" y="685800"/>
+            <a:ext cx="2010" cy="1415531"/>
+          </a:xfrm>
+          <a:prstGeom prst="line">
+            <a:avLst/>
+          </a:prstGeom>
+          <a:noFill/>
+          <a:ln w="25400">
+            <a:solidFill>
+              <a:schemeClr val="tx1"/>
+            </a:solidFill>
+            <a:prstDash val="sysDot"/>
+            <a:round/>
+            <a:headEnd/>
+            <a:tailEnd/>
+          </a:ln>
+          <a:effectLst/>
+          <a:extLst>
+            <a:ext uri="{909E8E84-426E-40DD-AFC4-6F175D3DCCD1}">
+              <a14:hiddenFill xmlns:a14="http://schemas.microsoft.com/office/drawing/2010/main">
+                <a:noFill/>
+              </a14:hiddenFill>
+            </a:ext>
+            <a:ext uri="{AF507438-7753-43E0-B8FC-AC1667EBCBE1}">
+              <a14:hiddenEffects xmlns:a14="http://schemas.microsoft.com/office/drawing/2010/main">
+                <a:effectLst>
+                  <a:outerShdw dist="35921" dir="2700000" algn="ctr" rotWithShape="0">
+                    <a:schemeClr val="bg2"/>
+                  </a:outerShdw>
+                </a:effectLst>
+              </a14:hiddenEffects>
+            </a:ext>
+          </a:extLst>
+        </p:spPr>
+        <p:txBody>
+          <a:bodyPr/>
+          <a:lstStyle>
+            <a:defPPr>
+              <a:defRPr lang="en-US"/>
+            </a:defPPr>
+            <a:lvl1pPr algn="l" rtl="0" fontAlgn="base">
+              <a:spcBef>
+                <a:spcPct val="0"/>
+              </a:spcBef>
+              <a:spcAft>
+                <a:spcPct val="0"/>
+              </a:spcAft>
+              <a:defRPr kern="1200">
+                <a:solidFill>
+                  <a:schemeClr val="tx1"/>
+                </a:solidFill>
+                <a:latin typeface="Arial" panose="020B0604020202020204" pitchFamily="34" charset="0"/>
+                <a:ea typeface="+mn-ea"/>
+                <a:cs typeface="+mn-cs"/>
+              </a:defRPr>
+            </a:lvl1pPr>
+            <a:lvl2pPr marL="457200" algn="l" rtl="0" fontAlgn="base">
+              <a:spcBef>
+                <a:spcPct val="0"/>
+              </a:spcBef>
+              <a:spcAft>
+                <a:spcPct val="0"/>
+              </a:spcAft>
+              <a:defRPr kern="1200">
+                <a:solidFill>
+                  <a:schemeClr val="tx1"/>
+                </a:solidFill>
+                <a:latin typeface="Arial" panose="020B0604020202020204" pitchFamily="34" charset="0"/>
+                <a:ea typeface="+mn-ea"/>
+                <a:cs typeface="+mn-cs"/>
+              </a:defRPr>
+            </a:lvl2pPr>
+            <a:lvl3pPr marL="914400" algn="l" rtl="0" fontAlgn="base">
+              <a:spcBef>
+                <a:spcPct val="0"/>
+              </a:spcBef>
+              <a:spcAft>
+                <a:spcPct val="0"/>
+              </a:spcAft>
+              <a:defRPr kern="1200">
+                <a:solidFill>
+                  <a:schemeClr val="tx1"/>
+                </a:solidFill>
+                <a:latin typeface="Arial" panose="020B0604020202020204" pitchFamily="34" charset="0"/>
+                <a:ea typeface="+mn-ea"/>
+                <a:cs typeface="+mn-cs"/>
+              </a:defRPr>
+            </a:lvl3pPr>
+            <a:lvl4pPr marL="1371600" algn="l" rtl="0" fontAlgn="base">
+              <a:spcBef>
+                <a:spcPct val="0"/>
+              </a:spcBef>
+              <a:spcAft>
+                <a:spcPct val="0"/>
+              </a:spcAft>
+              <a:defRPr kern="1200">
+                <a:solidFill>
+                  <a:schemeClr val="tx1"/>
+                </a:solidFill>
+                <a:latin typeface="Arial" panose="020B0604020202020204" pitchFamily="34" charset="0"/>
+                <a:ea typeface="+mn-ea"/>
+                <a:cs typeface="+mn-cs"/>
+              </a:defRPr>
+            </a:lvl4pPr>
+            <a:lvl5pPr marL="1828800" algn="l" rtl="0" fontAlgn="base">
+              <a:spcBef>
+                <a:spcPct val="0"/>
+              </a:spcBef>
+              <a:spcAft>
+                <a:spcPct val="0"/>
+              </a:spcAft>
+              <a:defRPr kern="1200">
+                <a:solidFill>
+                  <a:schemeClr val="tx1"/>
+                </a:solidFill>
+                <a:latin typeface="Arial" panose="020B0604020202020204" pitchFamily="34" charset="0"/>
+                <a:ea typeface="+mn-ea"/>
+                <a:cs typeface="+mn-cs"/>
+              </a:defRPr>
+            </a:lvl5pPr>
+            <a:lvl6pPr marL="2286000" algn="l" defTabSz="914400" rtl="0" eaLnBrk="1" latinLnBrk="0" hangingPunct="1">
+              <a:defRPr kern="1200">
+                <a:solidFill>
+                  <a:schemeClr val="tx1"/>
+                </a:solidFill>
+                <a:latin typeface="Arial" panose="020B0604020202020204" pitchFamily="34" charset="0"/>
+                <a:ea typeface="+mn-ea"/>
+                <a:cs typeface="+mn-cs"/>
+              </a:defRPr>
+            </a:lvl6pPr>
+            <a:lvl7pPr marL="2743200" algn="l" defTabSz="914400" rtl="0" eaLnBrk="1" latinLnBrk="0" hangingPunct="1">
+              <a:defRPr kern="1200">
+                <a:solidFill>
+                  <a:schemeClr val="tx1"/>
+                </a:solidFill>
+                <a:latin typeface="Arial" panose="020B0604020202020204" pitchFamily="34" charset="0"/>
+                <a:ea typeface="+mn-ea"/>
+                <a:cs typeface="+mn-cs"/>
+              </a:defRPr>
+            </a:lvl7pPr>
+            <a:lvl8pPr marL="3200400" algn="l" defTabSz="914400" rtl="0" eaLnBrk="1" latinLnBrk="0" hangingPunct="1">
+              <a:defRPr kern="1200">
+                <a:solidFill>
+                  <a:schemeClr val="tx1"/>
+                </a:solidFill>
+                <a:latin typeface="Arial" panose="020B0604020202020204" pitchFamily="34" charset="0"/>
+                <a:ea typeface="+mn-ea"/>
+                <a:cs typeface="+mn-cs"/>
+              </a:defRPr>
+            </a:lvl8pPr>
+            <a:lvl9pPr marL="3657600" algn="l" defTabSz="914400" rtl="0" eaLnBrk="1" latinLnBrk="0" hangingPunct="1">
+              <a:defRPr kern="1200">
+                <a:solidFill>
+                  <a:schemeClr val="tx1"/>
+                </a:solidFill>
+                <a:latin typeface="Arial" panose="020B0604020202020204" pitchFamily="34" charset="0"/>
+                <a:ea typeface="+mn-ea"/>
+                <a:cs typeface="+mn-cs"/>
+              </a:defRPr>
+            </a:lvl9pPr>
+          </a:lstStyle>
+          <a:p>
+            <a:endParaRPr lang="en-US"/>
           </a:p>
         </p:txBody>
       </p:sp>

</xml_diff>